<commit_message>
correcciones generales de contenido estadisticas y variables
</commit_message>
<xml_diff>
--- a/staticfiles/assets/Certificado_Sistema_SC.pptx
+++ b/staticfiles/assets/Certificado_Sistema_SC.pptx
@@ -63,7 +63,7 @@
         <p:txBody>
           <a:bodyPr/>
           <a:p>
-            <a:fld id="{E0BE0F66-06FA-4B11-AB4A-CAB0F5D5C1B5}" type="slidenum">
+            <a:fld id="{5C703B18-DFAB-4F56-8422-B3B85AED7088}" type="slidenum">
               <a:t>&lt;#&gt;</a:t>
             </a:fld>
           </a:p>
@@ -124,8 +124,8 @@
         </p:nvSpPr>
         <p:spPr>
           <a:xfrm>
-            <a:off x="685800" y="1122480"/>
-            <a:ext cx="7771680" cy="2386800"/>
+            <a:off x="457200" y="273600"/>
+            <a:ext cx="8229240" cy="1144800"/>
           </a:xfrm>
           <a:prstGeom prst="rect">
             <a:avLst/>
@@ -272,7 +272,7 @@
         <p:txBody>
           <a:bodyPr/>
           <a:p>
-            <a:fld id="{A95114BF-904B-4773-BFCB-E9CC7CFB276C}" type="slidenum">
+            <a:fld id="{09574C8F-AC0E-4BD9-8B14-CC17BC0F6C21}" type="slidenum">
               <a:t>&lt;#&gt;</a:t>
             </a:fld>
           </a:p>
@@ -333,8 +333,8 @@
         </p:nvSpPr>
         <p:spPr>
           <a:xfrm>
-            <a:off x="685800" y="1122480"/>
-            <a:ext cx="7771680" cy="2386800"/>
+            <a:off x="457200" y="273600"/>
+            <a:ext cx="8229240" cy="1144800"/>
           </a:xfrm>
           <a:prstGeom prst="rect">
             <a:avLst/>
@@ -567,7 +567,7 @@
         <p:txBody>
           <a:bodyPr/>
           <a:p>
-            <a:fld id="{98D1C667-E878-4934-889E-CC1BFA3214CF}" type="slidenum">
+            <a:fld id="{5B2BA37B-68F7-452C-BB01-50A0DEF2C3C6}" type="slidenum">
               <a:t>&lt;#&gt;</a:t>
             </a:fld>
           </a:p>
@@ -628,8 +628,8 @@
         </p:nvSpPr>
         <p:spPr>
           <a:xfrm>
-            <a:off x="685800" y="1122480"/>
-            <a:ext cx="7771680" cy="2386800"/>
+            <a:off x="457200" y="273600"/>
+            <a:ext cx="8229240" cy="1144800"/>
           </a:xfrm>
           <a:prstGeom prst="rect">
             <a:avLst/>
@@ -948,7 +948,7 @@
         <p:txBody>
           <a:bodyPr/>
           <a:p>
-            <a:fld id="{2234200D-F162-44B3-AB62-F93BE0ADE12E}" type="slidenum">
+            <a:fld id="{47997FA9-CA9B-4987-B0D0-BADCF4076E8E}" type="slidenum">
               <a:t>&lt;#&gt;</a:t>
             </a:fld>
           </a:p>
@@ -1009,8 +1009,8 @@
         </p:nvSpPr>
         <p:spPr>
           <a:xfrm>
-            <a:off x="685800" y="1122480"/>
-            <a:ext cx="7771680" cy="2386800"/>
+            <a:off x="457200" y="273600"/>
+            <a:ext cx="8229240" cy="1144800"/>
           </a:xfrm>
           <a:prstGeom prst="rect">
             <a:avLst/>
@@ -1111,7 +1111,7 @@
         <p:txBody>
           <a:bodyPr/>
           <a:p>
-            <a:fld id="{542AF379-A69C-48D3-9C09-70D464E120CE}" type="slidenum">
+            <a:fld id="{C3DC92D5-04F9-4AA4-8398-A08D58BDDE3D}" type="slidenum">
               <a:t>&lt;#&gt;</a:t>
             </a:fld>
           </a:p>
@@ -1172,8 +1172,8 @@
         </p:nvSpPr>
         <p:spPr>
           <a:xfrm>
-            <a:off x="685800" y="1122480"/>
-            <a:ext cx="7771680" cy="2386800"/>
+            <a:off x="457200" y="273600"/>
+            <a:ext cx="8229240" cy="1144800"/>
           </a:xfrm>
           <a:prstGeom prst="rect">
             <a:avLst/>
@@ -1277,7 +1277,7 @@
         <p:txBody>
           <a:bodyPr/>
           <a:p>
-            <a:fld id="{7460F32F-9D50-44A8-AE8F-33ECE4276F02}" type="slidenum">
+            <a:fld id="{EB300D63-F475-4E13-804E-ECA984EE4883}" type="slidenum">
               <a:t>&lt;#&gt;</a:t>
             </a:fld>
           </a:p>
@@ -1338,8 +1338,8 @@
         </p:nvSpPr>
         <p:spPr>
           <a:xfrm>
-            <a:off x="685800" y="1122480"/>
-            <a:ext cx="7771680" cy="2386800"/>
+            <a:off x="457200" y="273600"/>
+            <a:ext cx="8229240" cy="1144800"/>
           </a:xfrm>
           <a:prstGeom prst="rect">
             <a:avLst/>
@@ -1486,7 +1486,7 @@
         <p:txBody>
           <a:bodyPr/>
           <a:p>
-            <a:fld id="{669825EE-06D1-431B-A91D-AE1286C1FF0D}" type="slidenum">
+            <a:fld id="{9439F564-07CE-419C-B20F-27FE8ED3156B}" type="slidenum">
               <a:t>&lt;#&gt;</a:t>
             </a:fld>
           </a:p>
@@ -1547,8 +1547,8 @@
         </p:nvSpPr>
         <p:spPr>
           <a:xfrm>
-            <a:off x="685800" y="1122480"/>
-            <a:ext cx="7771680" cy="2386800"/>
+            <a:off x="457200" y="273600"/>
+            <a:ext cx="8229240" cy="1144800"/>
           </a:xfrm>
           <a:prstGeom prst="rect">
             <a:avLst/>
@@ -1609,7 +1609,7 @@
         <p:txBody>
           <a:bodyPr/>
           <a:p>
-            <a:fld id="{75AA017E-7F25-4ED1-953C-44474166FAAA}" type="slidenum">
+            <a:fld id="{384E2FBD-B8AC-44F0-A5F8-9AD7B1624133}" type="slidenum">
               <a:t>&lt;#&gt;</a:t>
             </a:fld>
           </a:p>
@@ -1670,8 +1670,8 @@
         </p:nvSpPr>
         <p:spPr>
           <a:xfrm>
-            <a:off x="685800" y="1122480"/>
-            <a:ext cx="7771680" cy="11064960"/>
+            <a:off x="457200" y="273600"/>
+            <a:ext cx="8229240" cy="5307840"/>
           </a:xfrm>
           <a:prstGeom prst="rect">
             <a:avLst/>
@@ -1730,7 +1730,7 @@
         <p:txBody>
           <a:bodyPr/>
           <a:p>
-            <a:fld id="{53DBFA9E-B9C3-4DF7-AF31-A5C522AAFB4B}" type="slidenum">
+            <a:fld id="{95F7948D-EB46-4C28-AB5A-DAD2ECF0E067}" type="slidenum">
               <a:t>&lt;#&gt;</a:t>
             </a:fld>
           </a:p>
@@ -1791,8 +1791,8 @@
         </p:nvSpPr>
         <p:spPr>
           <a:xfrm>
-            <a:off x="685800" y="1122480"/>
-            <a:ext cx="7771680" cy="2386800"/>
+            <a:off x="457200" y="273600"/>
+            <a:ext cx="8229240" cy="1144800"/>
           </a:xfrm>
           <a:prstGeom prst="rect">
             <a:avLst/>
@@ -1982,7 +1982,7 @@
         <p:txBody>
           <a:bodyPr/>
           <a:p>
-            <a:fld id="{1E68F59C-F607-4B69-9523-C92AF3994071}" type="slidenum">
+            <a:fld id="{BF93C2F8-A38E-4F69-9AAC-30F4D0658FA7}" type="slidenum">
               <a:t>&lt;#&gt;</a:t>
             </a:fld>
           </a:p>
@@ -2043,8 +2043,8 @@
         </p:nvSpPr>
         <p:spPr>
           <a:xfrm>
-            <a:off x="685800" y="1122480"/>
-            <a:ext cx="7771680" cy="2386800"/>
+            <a:off x="457200" y="273600"/>
+            <a:ext cx="8229240" cy="1144800"/>
           </a:xfrm>
           <a:prstGeom prst="rect">
             <a:avLst/>
@@ -2234,7 +2234,7 @@
         <p:txBody>
           <a:bodyPr/>
           <a:p>
-            <a:fld id="{8C1ED132-133F-4D23-83F2-248A1E9DF994}" type="slidenum">
+            <a:fld id="{DEA400AA-D050-464A-9F95-A0E6B3ED5DA8}" type="slidenum">
               <a:t>&lt;#&gt;</a:t>
             </a:fld>
           </a:p>
@@ -2295,8 +2295,8 @@
         </p:nvSpPr>
         <p:spPr>
           <a:xfrm>
-            <a:off x="685800" y="1122480"/>
-            <a:ext cx="7771680" cy="2386800"/>
+            <a:off x="457200" y="273600"/>
+            <a:ext cx="8229240" cy="1144800"/>
           </a:xfrm>
           <a:prstGeom prst="rect">
             <a:avLst/>
@@ -2486,7 +2486,7 @@
         <p:txBody>
           <a:bodyPr/>
           <a:p>
-            <a:fld id="{4BDF491C-A4B6-4792-9D0A-97EF12631DD4}" type="slidenum">
+            <a:fld id="{80CDC0AD-2FFD-4A17-8F59-F2E9D00AE2FB}" type="slidenum">
               <a:t>&lt;#&gt;</a:t>
             </a:fld>
           </a:p>
@@ -2549,62 +2549,13 @@
             <a:spLocks noGrp="1"/>
           </p:cNvSpPr>
           <p:nvPr>
-            <p:ph type="title"/>
-          </p:nvPr>
-        </p:nvSpPr>
-        <p:spPr>
-          <a:xfrm>
-            <a:off x="685800" y="1122480"/>
-            <a:ext cx="7771680" cy="2386800"/>
-          </a:xfrm>
-          <a:prstGeom prst="rect">
-            <a:avLst/>
-          </a:prstGeom>
-          <a:noFill/>
-          <a:ln w="0">
-            <a:noFill/>
-          </a:ln>
-        </p:spPr>
-        <p:txBody>
-          <a:bodyPr lIns="0" rIns="0" tIns="0" bIns="0" anchor="ctr">
-            <a:noAutofit/>
-          </a:bodyPr>
-          <a:p>
-            <a:pPr indent="0">
-              <a:buNone/>
-            </a:pPr>
-            <a:r>
-              <a:rPr b="0" lang="es-VE" sz="1800" spc="-1" strike="noStrike">
-                <a:solidFill>
-                  <a:srgbClr val="000000"/>
-                </a:solidFill>
-                <a:latin typeface="Arial"/>
-              </a:rPr>
-              <a:t>Click to edit the title text format</a:t>
-            </a:r>
-            <a:endParaRPr b="0" lang="es-VE" sz="1800" spc="-1" strike="noStrike">
-              <a:solidFill>
-                <a:srgbClr val="000000"/>
-              </a:solidFill>
-              <a:latin typeface="Arial"/>
-            </a:endParaRPr>
-          </a:p>
-        </p:txBody>
-      </p:sp>
-      <p:sp>
-        <p:nvSpPr>
-          <p:cNvPr id="1" name="PlaceHolder 2"/>
-          <p:cNvSpPr>
-            <a:spLocks noGrp="1"/>
-          </p:cNvSpPr>
-          <p:nvPr>
             <p:ph type="ftr" idx="1"/>
           </p:nvPr>
         </p:nvSpPr>
         <p:spPr>
           <a:xfrm>
             <a:off x="3029040" y="6356520"/>
-            <a:ext cx="3085560" cy="364320"/>
+            <a:ext cx="3084120" cy="362880"/>
           </a:xfrm>
           <a:prstGeom prst="rect">
             <a:avLst/>
@@ -2665,7 +2616,7 @@
       </p:sp>
       <p:sp>
         <p:nvSpPr>
-          <p:cNvPr id="2" name="PlaceHolder 3"/>
+          <p:cNvPr id="1" name="PlaceHolder 2"/>
           <p:cNvSpPr>
             <a:spLocks noGrp="1"/>
           </p:cNvSpPr>
@@ -2676,7 +2627,7 @@
         <p:spPr>
           <a:xfrm>
             <a:off x="6458040" y="6356520"/>
-            <a:ext cx="2056680" cy="364320"/>
+            <a:ext cx="2055240" cy="362880"/>
           </a:xfrm>
           <a:prstGeom prst="rect">
             <a:avLst/>
@@ -2717,7 +2668,7 @@
                 <a:tab algn="l" pos="0"/>
               </a:tabLst>
             </a:pPr>
-            <a:fld id="{30F6E8E6-DF47-486D-9BDC-7CDCC4E85B2B}" type="slidenum">
+            <a:fld id="{B51E6F25-3477-4DAB-98F0-066A0900256A}" type="slidenum">
               <a:rPr b="0" lang="es-VE" sz="1200" spc="-1" strike="noStrike">
                 <a:solidFill>
                   <a:srgbClr val="8b8b8b"/>
@@ -2737,7 +2688,7 @@
       </p:sp>
       <p:sp>
         <p:nvSpPr>
-          <p:cNvPr id="3" name="PlaceHolder 4"/>
+          <p:cNvPr id="2" name="PlaceHolder 3"/>
           <p:cNvSpPr>
             <a:spLocks noGrp="1"/>
           </p:cNvSpPr>
@@ -2748,7 +2699,7 @@
         <p:spPr>
           <a:xfrm>
             <a:off x="628560" y="6356520"/>
-            <a:ext cx="2056680" cy="364320"/>
+            <a:ext cx="2055240" cy="362880"/>
           </a:xfrm>
           <a:prstGeom prst="rect">
             <a:avLst/>
@@ -2791,6 +2742,55 @@
                 <a:srgbClr val="000000"/>
               </a:solidFill>
               <a:latin typeface="Times New Roman"/>
+            </a:endParaRPr>
+          </a:p>
+        </p:txBody>
+      </p:sp>
+      <p:sp>
+        <p:nvSpPr>
+          <p:cNvPr id="3" name="PlaceHolder 4"/>
+          <p:cNvSpPr>
+            <a:spLocks noGrp="1"/>
+          </p:cNvSpPr>
+          <p:nvPr>
+            <p:ph type="title"/>
+          </p:nvPr>
+        </p:nvSpPr>
+        <p:spPr>
+          <a:xfrm>
+            <a:off x="457200" y="273600"/>
+            <a:ext cx="8229240" cy="1144800"/>
+          </a:xfrm>
+          <a:prstGeom prst="rect">
+            <a:avLst/>
+          </a:prstGeom>
+          <a:noFill/>
+          <a:ln w="0">
+            <a:noFill/>
+          </a:ln>
+        </p:spPr>
+        <p:txBody>
+          <a:bodyPr lIns="0" rIns="0" tIns="0" bIns="0" anchor="ctr">
+            <a:noAutofit/>
+          </a:bodyPr>
+          <a:p>
+            <a:pPr indent="0" algn="ctr">
+              <a:buNone/>
+            </a:pPr>
+            <a:r>
+              <a:rPr b="0" lang="es-VE" sz="4400" spc="-1" strike="noStrike">
+                <a:solidFill>
+                  <a:srgbClr val="000000"/>
+                </a:solidFill>
+                <a:latin typeface="Arial"/>
+              </a:rPr>
+              <a:t>Click to edit the title text format</a:t>
+            </a:r>
+            <a:endParaRPr b="0" lang="es-VE" sz="4400" spc="-1" strike="noStrike">
+              <a:solidFill>
+                <a:srgbClr val="000000"/>
+              </a:solidFill>
+              <a:latin typeface="Arial"/>
             </a:endParaRPr>
           </a:p>
         </p:txBody>
@@ -3069,8 +3069,8 @@
         </p:blipFill>
         <p:spPr>
           <a:xfrm>
-            <a:off x="0" y="0"/>
-            <a:ext cx="9143280" cy="6857280"/>
+            <a:off x="37440" y="-16560"/>
+            <a:ext cx="9141840" cy="6855840"/>
           </a:xfrm>
           <a:prstGeom prst="rect">
             <a:avLst/>
@@ -3088,8 +3088,8 @@
         </p:nvSpPr>
         <p:spPr>
           <a:xfrm>
-            <a:off x="152640" y="2024280"/>
-            <a:ext cx="8810640" cy="394560"/>
+            <a:off x="3208320" y="2132280"/>
+            <a:ext cx="2511360" cy="394560"/>
           </a:xfrm>
           <a:prstGeom prst="rect">
             <a:avLst/>
@@ -3115,16 +3115,6 @@
                 <a:spcPct val="100000"/>
               </a:lnSpc>
             </a:pPr>
-            <a:r>
-              <a:rPr b="0" lang="es-ES" sz="2000" spc="-1" strike="noStrike">
-                <a:solidFill>
-                  <a:srgbClr val="ffffff"/>
-                </a:solidFill>
-                <a:latin typeface="Calibri"/>
-                <a:ea typeface="DejaVu Sans"/>
-              </a:rPr>
-              <a:t> </a:t>
-            </a:r>
             <a:r>
               <a:rPr b="0" lang="es-ES" sz="2000" spc="-1" strike="noStrike">
                 <a:solidFill>
@@ -3152,8 +3142,8 @@
         </p:nvSpPr>
         <p:spPr>
           <a:xfrm>
-            <a:off x="3438360" y="2505960"/>
-            <a:ext cx="658080" cy="455400"/>
+            <a:off x="3474360" y="2541960"/>
+            <a:ext cx="656640" cy="455400"/>
           </a:xfrm>
           <a:prstGeom prst="rect">
             <a:avLst/>
@@ -3206,8 +3196,8 @@
         </p:nvSpPr>
         <p:spPr>
           <a:xfrm>
-            <a:off x="2362320" y="3345480"/>
-            <a:ext cx="1208520" cy="363960"/>
+            <a:off x="1174320" y="3381480"/>
+            <a:ext cx="1207080" cy="363960"/>
           </a:xfrm>
           <a:prstGeom prst="rect">
             <a:avLst/>
@@ -3261,7 +3251,7 @@
         <p:spPr>
           <a:xfrm>
             <a:off x="7264080" y="5746680"/>
-            <a:ext cx="1249200" cy="363960"/>
+            <a:ext cx="1248120" cy="363960"/>
           </a:xfrm>
           <a:prstGeom prst="rect">
             <a:avLst/>
@@ -3325,7 +3315,7 @@
         <p:spPr>
           <a:xfrm>
             <a:off x="7826760" y="5369760"/>
-            <a:ext cx="1244880" cy="272160"/>
+            <a:ext cx="1243440" cy="272160"/>
           </a:xfrm>
           <a:prstGeom prst="rect">
             <a:avLst/>
@@ -3382,7 +3372,7 @@
         <p:spPr>
           <a:xfrm>
             <a:off x="7129080" y="4032000"/>
-            <a:ext cx="1618920" cy="1347480"/>
+            <a:ext cx="1617480" cy="1346040"/>
           </a:xfrm>
           <a:prstGeom prst="rect">
             <a:avLst/>
@@ -3422,7 +3412,7 @@
             </a:r>
             <a:endParaRPr b="0" lang="es-VE" sz="7200" spc="-1" strike="noStrike">
               <a:solidFill>
-                <a:srgbClr val="ffffff"/>
+                <a:srgbClr val="000000"/>
               </a:solidFill>
               <a:latin typeface="Arial"/>
             </a:endParaRPr>
@@ -3437,8 +3427,8 @@
         </p:nvSpPr>
         <p:spPr>
           <a:xfrm>
-            <a:off x="3434760" y="3348360"/>
-            <a:ext cx="4885560" cy="363960"/>
+            <a:off x="2138760" y="3384360"/>
+            <a:ext cx="4884120" cy="363960"/>
           </a:xfrm>
           <a:prstGeom prst="rect">
             <a:avLst/>
@@ -3492,7 +3482,7 @@
         <p:spPr>
           <a:xfrm>
             <a:off x="4056120" y="2563200"/>
-            <a:ext cx="1774800" cy="363960"/>
+            <a:ext cx="1773720" cy="363960"/>
           </a:xfrm>
           <a:prstGeom prst="rect">
             <a:avLst/>

</xml_diff>